<commit_message>
Make code sample font bigger
</commit_message>
<xml_diff>
--- a/presentation.pptx
+++ b/presentation.pptx
@@ -365,7 +365,7 @@
           <a:p>
             <a:fld id="{0D29E5F6-4055-AE4B-98F5-9E8595080BB9}" type="datetimeFigureOut">
               <a:rPr lang="en-US" smtClean="0"/>
-              <a:t>4/11/19</a:t>
+              <a:t>4/12/19</a:t>
             </a:fld>
             <a:endParaRPr lang="en-US"/>
           </a:p>
@@ -3039,7 +3039,7 @@
           <a:p>
             <a:fld id="{6B8850C4-06AA-7A41-95BA-992E22A95E4A}" type="datetime1">
               <a:rPr lang="en-US" smtClean="0"/>
-              <a:t>4/11/19</a:t>
+              <a:t>4/12/19</a:t>
             </a:fld>
             <a:endParaRPr lang="en-US"/>
           </a:p>
@@ -3327,7 +3327,7 @@
           <a:p>
             <a:fld id="{CCC3B255-31AB-ED41-BF34-9EC437ADFDDB}" type="datetime1">
               <a:rPr lang="en-US" smtClean="0"/>
-              <a:t>4/11/19</a:t>
+              <a:t>4/12/19</a:t>
             </a:fld>
             <a:endParaRPr lang="en-US"/>
           </a:p>
@@ -3525,7 +3525,7 @@
           <a:p>
             <a:fld id="{245DC9CE-27F6-8A44-9D00-6B9C1B82C922}" type="datetime1">
               <a:rPr lang="en-US" smtClean="0"/>
-              <a:t>4/11/19</a:t>
+              <a:t>4/12/19</a:t>
             </a:fld>
             <a:endParaRPr lang="en-US"/>
           </a:p>
@@ -3733,7 +3733,7 @@
           <a:p>
             <a:fld id="{DF3C07A2-2962-8541-88FA-C03D94E72787}" type="datetime1">
               <a:rPr lang="en-US" smtClean="0"/>
-              <a:t>4/11/19</a:t>
+              <a:t>4/12/19</a:t>
             </a:fld>
             <a:endParaRPr lang="en-US"/>
           </a:p>
@@ -3906,7 +3906,7 @@
             <a:fld id="{A9743519-5124-704D-87DB-584842E11EAC}" type="datetime1">
               <a:rPr lang="en-US" smtClean="0"/>
               <a:pPr/>
-              <a:t>4/11/19</a:t>
+              <a:t>4/12/19</a:t>
             </a:fld>
             <a:endParaRPr lang="en-US" dirty="0"/>
           </a:p>
@@ -4023,7 +4023,7 @@
                 <a:spcPct val="100000"/>
               </a:lnSpc>
               <a:buNone/>
-              <a:defRPr sz="1200">
+              <a:defRPr sz="1600">
                 <a:solidFill>
                   <a:srgbClr val="A9B7C6"/>
                 </a:solidFill>
@@ -4036,7 +4036,7 @@
                 <a:spcPct val="100000"/>
               </a:lnSpc>
               <a:buNone/>
-              <a:defRPr sz="1200">
+              <a:defRPr sz="1600">
                 <a:solidFill>
                   <a:srgbClr val="A9B7C6"/>
                 </a:solidFill>
@@ -4049,7 +4049,7 @@
                 <a:spcPct val="100000"/>
               </a:lnSpc>
               <a:buNone/>
-              <a:defRPr sz="1200">
+              <a:defRPr sz="1600">
                 <a:solidFill>
                   <a:srgbClr val="A9B7C6"/>
                 </a:solidFill>
@@ -4062,7 +4062,7 @@
                 <a:spcPct val="100000"/>
               </a:lnSpc>
               <a:buNone/>
-              <a:defRPr sz="1200">
+              <a:defRPr sz="1600">
                 <a:solidFill>
                   <a:srgbClr val="A9B7C6"/>
                 </a:solidFill>
@@ -4075,7 +4075,7 @@
                 <a:spcPct val="100000"/>
               </a:lnSpc>
               <a:buNone/>
-              <a:defRPr sz="1200">
+              <a:defRPr sz="1600">
                 <a:solidFill>
                   <a:srgbClr val="A9B7C6"/>
                 </a:solidFill>
@@ -4307,7 +4307,7 @@
           <a:p>
             <a:fld id="{37496812-23C4-2E48-AC67-778987793078}" type="datetime1">
               <a:rPr lang="en-US" smtClean="0"/>
-              <a:t>4/11/19</a:t>
+              <a:t>4/12/19</a:t>
             </a:fld>
             <a:endParaRPr lang="en-US"/>
           </a:p>
@@ -4510,7 +4510,7 @@
           <a:p>
             <a:fld id="{37496812-23C4-2E48-AC67-778987793078}" type="datetime1">
               <a:rPr lang="en-US" smtClean="0"/>
-              <a:t>4/11/19</a:t>
+              <a:t>4/12/19</a:t>
             </a:fld>
             <a:endParaRPr lang="en-US"/>
           </a:p>
@@ -4832,7 +4832,7 @@
           <a:p>
             <a:fld id="{0A4C7175-D5C3-2A40-B2CB-ADAE558A04F1}" type="datetime1">
               <a:rPr lang="en-US" smtClean="0"/>
-              <a:t>4/11/19</a:t>
+              <a:t>4/12/19</a:t>
             </a:fld>
             <a:endParaRPr lang="en-US"/>
           </a:p>
@@ -5097,7 +5097,7 @@
           <a:p>
             <a:fld id="{ABA2A8C5-3E99-0A48-BC01-8D7DFBA0AF79}" type="datetime1">
               <a:rPr lang="en-US" smtClean="0"/>
-              <a:t>4/11/19</a:t>
+              <a:t>4/12/19</a:t>
             </a:fld>
             <a:endParaRPr lang="en-US"/>
           </a:p>
@@ -5509,7 +5509,7 @@
           <a:p>
             <a:fld id="{2CE60067-8E67-BF41-A5B8-F2241EAC4833}" type="datetime1">
               <a:rPr lang="en-US" smtClean="0"/>
-              <a:t>4/11/19</a:t>
+              <a:t>4/12/19</a:t>
             </a:fld>
             <a:endParaRPr lang="en-US"/>
           </a:p>
@@ -5650,7 +5650,7 @@
           <a:p>
             <a:fld id="{D71B1015-0580-174F-9D9C-B0059C2A70EC}" type="datetime1">
               <a:rPr lang="en-US" smtClean="0"/>
-              <a:t>4/11/19</a:t>
+              <a:t>4/12/19</a:t>
             </a:fld>
             <a:endParaRPr lang="en-US"/>
           </a:p>
@@ -5763,7 +5763,7 @@
           <a:p>
             <a:fld id="{0B129F4C-57FA-4047-B335-92259A8314CD}" type="datetime1">
               <a:rPr lang="en-US" smtClean="0"/>
-              <a:t>4/11/19</a:t>
+              <a:t>4/12/19</a:t>
             </a:fld>
             <a:endParaRPr lang="en-US"/>
           </a:p>
@@ -6074,7 +6074,7 @@
           <a:p>
             <a:fld id="{C0A1ECED-8D9F-974B-9A87-C4497828B3B3}" type="datetime1">
               <a:rPr lang="en-US" smtClean="0"/>
-              <a:t>4/11/19</a:t>
+              <a:t>4/12/19</a:t>
             </a:fld>
             <a:endParaRPr lang="en-US"/>
           </a:p>
@@ -6315,7 +6315,7 @@
           <a:p>
             <a:fld id="{9BA7D37C-7E4C-B046-88DC-35926AEFD674}" type="datetime1">
               <a:rPr lang="en-US" smtClean="0"/>
-              <a:t>4/11/19</a:t>
+              <a:t>4/12/19</a:t>
             </a:fld>
             <a:endParaRPr lang="en-US"/>
           </a:p>
@@ -6830,11 +6830,11 @@
   <p:clrMapOvr>
     <a:masterClrMapping/>
   </p:clrMapOvr>
-  <mc:AlternateContent xmlns:mc="http://schemas.openxmlformats.org/markup-compatibility/2006">
-    <mc:Choice xmlns:p14="http://schemas.microsoft.com/office/powerpoint/2010/main" Requires="p14">
+  <mc:AlternateContent xmlns:mc="http://schemas.openxmlformats.org/markup-compatibility/2006" xmlns:p14="http://schemas.microsoft.com/office/powerpoint/2010/main">
+    <mc:Choice Requires="p14">
       <p:transition spd="slow" p14:dur="2000" advTm="6969"/>
     </mc:Choice>
-    <mc:Fallback>
+    <mc:Fallback xmlns="">
       <p:transition spd="slow" advTm="6969"/>
     </mc:Fallback>
   </mc:AlternateContent>
@@ -7034,11 +7034,11 @@
   <p:clrMapOvr>
     <a:masterClrMapping/>
   </p:clrMapOvr>
-  <mc:AlternateContent xmlns:mc="http://schemas.openxmlformats.org/markup-compatibility/2006">
-    <mc:Choice xmlns:p14="http://schemas.microsoft.com/office/powerpoint/2010/main" Requires="p14">
+  <mc:AlternateContent xmlns:mc="http://schemas.openxmlformats.org/markup-compatibility/2006" xmlns:p14="http://schemas.microsoft.com/office/powerpoint/2010/main">
+    <mc:Choice Requires="p14">
       <p:transition spd="slow" p14:dur="2000" advTm="48479"/>
     </mc:Choice>
-    <mc:Fallback>
+    <mc:Fallback xmlns="">
       <p:transition spd="slow" advTm="48479"/>
     </mc:Fallback>
   </mc:AlternateContent>
@@ -7229,11 +7229,11 @@
   <p:clrMapOvr>
     <a:masterClrMapping/>
   </p:clrMapOvr>
-  <mc:AlternateContent xmlns:mc="http://schemas.openxmlformats.org/markup-compatibility/2006">
-    <mc:Choice xmlns:p14="http://schemas.microsoft.com/office/powerpoint/2010/main" Requires="p14">
+  <mc:AlternateContent xmlns:mc="http://schemas.openxmlformats.org/markup-compatibility/2006" xmlns:p14="http://schemas.microsoft.com/office/powerpoint/2010/main">
+    <mc:Choice Requires="p14">
       <p:transition spd="slow" p14:dur="2000" advTm="35875"/>
     </mc:Choice>
-    <mc:Fallback>
+    <mc:Fallback xmlns="">
       <p:transition spd="slow" advTm="35875"/>
     </mc:Fallback>
   </mc:AlternateContent>
@@ -7373,11 +7373,11 @@
   <p:clrMapOvr>
     <a:masterClrMapping/>
   </p:clrMapOvr>
-  <mc:AlternateContent xmlns:mc="http://schemas.openxmlformats.org/markup-compatibility/2006">
-    <mc:Choice xmlns:p14="http://schemas.microsoft.com/office/powerpoint/2010/main" Requires="p14">
+  <mc:AlternateContent xmlns:mc="http://schemas.openxmlformats.org/markup-compatibility/2006" xmlns:p14="http://schemas.microsoft.com/office/powerpoint/2010/main">
+    <mc:Choice Requires="p14">
       <p:transition spd="slow" p14:dur="2000" advTm="50163"/>
     </mc:Choice>
-    <mc:Fallback>
+    <mc:Fallback xmlns="">
       <p:transition spd="slow" advTm="50163"/>
     </mc:Fallback>
   </mc:AlternateContent>
@@ -7549,11 +7549,11 @@
   <p:clrMapOvr>
     <a:masterClrMapping/>
   </p:clrMapOvr>
-  <mc:AlternateContent xmlns:mc="http://schemas.openxmlformats.org/markup-compatibility/2006">
-    <mc:Choice xmlns:p14="http://schemas.microsoft.com/office/powerpoint/2010/main" Requires="p14">
+  <mc:AlternateContent xmlns:mc="http://schemas.openxmlformats.org/markup-compatibility/2006" xmlns:p14="http://schemas.microsoft.com/office/powerpoint/2010/main">
+    <mc:Choice Requires="p14">
       <p:transition spd="slow" p14:dur="2000" advTm="42249"/>
     </mc:Choice>
-    <mc:Fallback>
+    <mc:Fallback xmlns="">
       <p:transition spd="slow" advTm="42249"/>
     </mc:Fallback>
   </mc:AlternateContent>
@@ -7669,11 +7669,11 @@
   <p:clrMapOvr>
     <a:masterClrMapping/>
   </p:clrMapOvr>
-  <mc:AlternateContent xmlns:mc="http://schemas.openxmlformats.org/markup-compatibility/2006">
-    <mc:Choice xmlns:p14="http://schemas.microsoft.com/office/powerpoint/2010/main" Requires="p14">
+  <mc:AlternateContent xmlns:mc="http://schemas.openxmlformats.org/markup-compatibility/2006" xmlns:p14="http://schemas.microsoft.com/office/powerpoint/2010/main">
+    <mc:Choice Requires="p14">
       <p:transition spd="slow" p14:dur="2000" advTm="6050"/>
     </mc:Choice>
-    <mc:Fallback>
+    <mc:Fallback xmlns="">
       <p:transition spd="slow" advTm="6050"/>
     </mc:Fallback>
   </mc:AlternateContent>
@@ -7804,11 +7804,11 @@
   <p:clrMapOvr>
     <a:masterClrMapping/>
   </p:clrMapOvr>
-  <mc:AlternateContent xmlns:mc="http://schemas.openxmlformats.org/markup-compatibility/2006">
-    <mc:Choice xmlns:p14="http://schemas.microsoft.com/office/powerpoint/2010/main" Requires="p14">
+  <mc:AlternateContent xmlns:mc="http://schemas.openxmlformats.org/markup-compatibility/2006" xmlns:p14="http://schemas.microsoft.com/office/powerpoint/2010/main">
+    <mc:Choice Requires="p14">
       <p:transition spd="slow" p14:dur="2000" advTm="11198"/>
     </mc:Choice>
-    <mc:Fallback>
+    <mc:Fallback xmlns="">
       <p:transition spd="slow" advTm="11198"/>
     </mc:Fallback>
   </mc:AlternateContent>
@@ -7958,11 +7958,11 @@
   <p:clrMapOvr>
     <a:masterClrMapping/>
   </p:clrMapOvr>
-  <mc:AlternateContent xmlns:mc="http://schemas.openxmlformats.org/markup-compatibility/2006">
-    <mc:Choice xmlns:p14="http://schemas.microsoft.com/office/powerpoint/2010/main" Requires="p14">
+  <mc:AlternateContent xmlns:mc="http://schemas.openxmlformats.org/markup-compatibility/2006" xmlns:p14="http://schemas.microsoft.com/office/powerpoint/2010/main">
+    <mc:Choice Requires="p14">
       <p:transition spd="slow" p14:dur="2000" advTm="21106"/>
     </mc:Choice>
-    <mc:Fallback>
+    <mc:Fallback xmlns="">
       <p:transition spd="slow" advTm="21106"/>
     </mc:Fallback>
   </mc:AlternateContent>
@@ -8112,11 +8112,11 @@
   <p:clrMapOvr>
     <a:masterClrMapping/>
   </p:clrMapOvr>
-  <mc:AlternateContent xmlns:mc="http://schemas.openxmlformats.org/markup-compatibility/2006">
-    <mc:Choice xmlns:p14="http://schemas.microsoft.com/office/powerpoint/2010/main" Requires="p14">
+  <mc:AlternateContent xmlns:mc="http://schemas.openxmlformats.org/markup-compatibility/2006" xmlns:p14="http://schemas.microsoft.com/office/powerpoint/2010/main">
+    <mc:Choice Requires="p14">
       <p:transition spd="slow" p14:dur="2000" advTm="18047"/>
     </mc:Choice>
-    <mc:Fallback>
+    <mc:Fallback xmlns="">
       <p:transition spd="slow" advTm="18047"/>
     </mc:Fallback>
   </mc:AlternateContent>
@@ -8247,11 +8247,11 @@
   <p:clrMapOvr>
     <a:masterClrMapping/>
   </p:clrMapOvr>
-  <mc:AlternateContent xmlns:mc="http://schemas.openxmlformats.org/markup-compatibility/2006">
-    <mc:Choice xmlns:p14="http://schemas.microsoft.com/office/powerpoint/2010/main" Requires="p14">
+  <mc:AlternateContent xmlns:mc="http://schemas.openxmlformats.org/markup-compatibility/2006" xmlns:p14="http://schemas.microsoft.com/office/powerpoint/2010/main">
+    <mc:Choice Requires="p14">
       <p:transition spd="slow" p14:dur="2000" advTm="33472"/>
     </mc:Choice>
-    <mc:Fallback>
+    <mc:Fallback xmlns="">
       <p:transition spd="slow" advTm="33472"/>
     </mc:Fallback>
   </mc:AlternateContent>
@@ -8396,11 +8396,11 @@
   <p:clrMapOvr>
     <a:masterClrMapping/>
   </p:clrMapOvr>
-  <mc:AlternateContent xmlns:mc="http://schemas.openxmlformats.org/markup-compatibility/2006">
-    <mc:Choice xmlns:p14="http://schemas.microsoft.com/office/powerpoint/2010/main" Requires="p14">
+  <mc:AlternateContent xmlns:mc="http://schemas.openxmlformats.org/markup-compatibility/2006" xmlns:p14="http://schemas.microsoft.com/office/powerpoint/2010/main">
+    <mc:Choice Requires="p14">
       <p:transition spd="slow" p14:dur="2000" advTm="10993"/>
     </mc:Choice>
-    <mc:Fallback>
+    <mc:Fallback xmlns="">
       <p:transition spd="slow" advTm="10993"/>
     </mc:Fallback>
   </mc:AlternateContent>
@@ -8563,11 +8563,11 @@
   <p:clrMapOvr>
     <a:masterClrMapping/>
   </p:clrMapOvr>
-  <mc:AlternateContent xmlns:mc="http://schemas.openxmlformats.org/markup-compatibility/2006">
-    <mc:Choice xmlns:p14="http://schemas.microsoft.com/office/powerpoint/2010/main" Requires="p14">
+  <mc:AlternateContent xmlns:mc="http://schemas.openxmlformats.org/markup-compatibility/2006" xmlns:p14="http://schemas.microsoft.com/office/powerpoint/2010/main">
+    <mc:Choice Requires="p14">
       <p:transition spd="slow" p14:dur="2000" advTm="21872"/>
     </mc:Choice>
-    <mc:Fallback>
+    <mc:Fallback xmlns="">
       <p:transition spd="slow" advTm="21872"/>
     </mc:Fallback>
   </mc:AlternateContent>
@@ -12643,11 +12643,11 @@
   <p:clrMapOvr>
     <a:masterClrMapping/>
   </p:clrMapOvr>
-  <mc:AlternateContent xmlns:mc="http://schemas.openxmlformats.org/markup-compatibility/2006">
-    <mc:Choice xmlns:p14="http://schemas.microsoft.com/office/powerpoint/2010/main" Requires="p14">
+  <mc:AlternateContent xmlns:mc="http://schemas.openxmlformats.org/markup-compatibility/2006" xmlns:p14="http://schemas.microsoft.com/office/powerpoint/2010/main">
+    <mc:Choice Requires="p14">
       <p:transition spd="slow" p14:dur="2000" advTm="1931"/>
     </mc:Choice>
-    <mc:Fallback>
+    <mc:Fallback xmlns="">
       <p:transition spd="slow" advTm="1931"/>
     </mc:Fallback>
   </mc:AlternateContent>
@@ -12854,7 +12854,7 @@
         <p:spPr/>
         <p:txBody>
           <a:bodyPr>
-            <a:normAutofit/>
+            <a:normAutofit lnSpcReduction="10000"/>
           </a:bodyPr>
           <a:lstStyle/>
           <a:p>
@@ -13814,7 +13814,9 @@
         </p:nvSpPr>
         <p:spPr/>
         <p:txBody>
-          <a:bodyPr/>
+          <a:bodyPr>
+            <a:normAutofit lnSpcReduction="10000"/>
+          </a:bodyPr>
           <a:lstStyle/>
           <a:p>
             <a:r>
@@ -15465,11 +15467,11 @@
   <p:clrMapOvr>
     <a:masterClrMapping/>
   </p:clrMapOvr>
-  <mc:AlternateContent xmlns:mc="http://schemas.openxmlformats.org/markup-compatibility/2006">
-    <mc:Choice xmlns:p14="http://schemas.microsoft.com/office/powerpoint/2010/main" Requires="p14">
+  <mc:AlternateContent xmlns:mc="http://schemas.openxmlformats.org/markup-compatibility/2006" xmlns:p14="http://schemas.microsoft.com/office/powerpoint/2010/main">
+    <mc:Choice Requires="p14">
       <p:transition spd="slow" p14:dur="2000" advTm="22587"/>
     </mc:Choice>
-    <mc:Fallback>
+    <mc:Fallback xmlns="">
       <p:transition spd="slow" advTm="22587"/>
     </mc:Fallback>
   </mc:AlternateContent>
@@ -15702,7 +15704,9 @@
         </p:nvSpPr>
         <p:spPr/>
         <p:txBody>
-          <a:bodyPr/>
+          <a:bodyPr>
+            <a:normAutofit fontScale="92500" lnSpcReduction="10000"/>
+          </a:bodyPr>
           <a:lstStyle/>
           <a:p>
             <a:r>
@@ -18319,6 +18323,14 @@
             <a:r>
               <a:rPr lang="en-US" b="1" dirty="0">
                 <a:solidFill>
+                  <a:srgbClr val="0080FF"/>
+                </a:solidFill>
+              </a:rPr>
+              <a:t>in </a:t>
+            </a:r>
+            <a:r>
+              <a:rPr lang="en-US" b="1" dirty="0">
+                <a:solidFill>
                   <a:srgbClr val="008080"/>
                 </a:solidFill>
               </a:rPr>
@@ -18830,11 +18842,11 @@
   <p:clrMapOvr>
     <a:masterClrMapping/>
   </p:clrMapOvr>
-  <mc:AlternateContent xmlns:mc="http://schemas.openxmlformats.org/markup-compatibility/2006">
-    <mc:Choice xmlns:p14="http://schemas.microsoft.com/office/powerpoint/2010/main" Requires="p14">
+  <mc:AlternateContent xmlns:mc="http://schemas.openxmlformats.org/markup-compatibility/2006" xmlns:p14="http://schemas.microsoft.com/office/powerpoint/2010/main">
+    <mc:Choice Requires="p14">
       <p:transition spd="slow" p14:dur="2000" advTm="15401"/>
     </mc:Choice>
-    <mc:Fallback>
+    <mc:Fallback xmlns="">
       <p:transition spd="slow" advTm="15401"/>
     </mc:Fallback>
   </mc:AlternateContent>
@@ -20964,11 +20976,11 @@
   <p:clrMapOvr>
     <a:masterClrMapping/>
   </p:clrMapOvr>
-  <mc:AlternateContent xmlns:mc="http://schemas.openxmlformats.org/markup-compatibility/2006">
-    <mc:Choice xmlns:p14="http://schemas.microsoft.com/office/powerpoint/2010/main" Requires="p14">
+  <mc:AlternateContent xmlns:mc="http://schemas.openxmlformats.org/markup-compatibility/2006" xmlns:p14="http://schemas.microsoft.com/office/powerpoint/2010/main">
+    <mc:Choice Requires="p14">
       <p:transition spd="slow" p14:dur="2000" advTm="25381"/>
     </mc:Choice>
-    <mc:Fallback>
+    <mc:Fallback xmlns="">
       <p:transition spd="slow" advTm="25381"/>
     </mc:Fallback>
   </mc:AlternateContent>
@@ -22025,11 +22037,11 @@
   <p:clrMapOvr>
     <a:masterClrMapping/>
   </p:clrMapOvr>
-  <mc:AlternateContent xmlns:mc="http://schemas.openxmlformats.org/markup-compatibility/2006">
-    <mc:Choice xmlns:p14="http://schemas.microsoft.com/office/powerpoint/2010/main" Requires="p14">
+  <mc:AlternateContent xmlns:mc="http://schemas.openxmlformats.org/markup-compatibility/2006" xmlns:p14="http://schemas.microsoft.com/office/powerpoint/2010/main">
+    <mc:Choice Requires="p14">
       <p:transition spd="slow" p14:dur="2000" advTm="47055"/>
     </mc:Choice>
-    <mc:Fallback>
+    <mc:Fallback xmlns="">
       <p:transition spd="slow" advTm="47055"/>
     </mc:Fallback>
   </mc:AlternateContent>
@@ -22162,11 +22174,11 @@
   <p:clrMapOvr>
     <a:masterClrMapping/>
   </p:clrMapOvr>
-  <mc:AlternateContent xmlns:mc="http://schemas.openxmlformats.org/markup-compatibility/2006">
-    <mc:Choice xmlns:p14="http://schemas.microsoft.com/office/powerpoint/2010/main" Requires="p14">
+  <mc:AlternateContent xmlns:mc="http://schemas.openxmlformats.org/markup-compatibility/2006" xmlns:p14="http://schemas.microsoft.com/office/powerpoint/2010/main">
+    <mc:Choice Requires="p14">
       <p:transition spd="slow" p14:dur="2000" advTm="23013"/>
     </mc:Choice>
-    <mc:Fallback>
+    <mc:Fallback xmlns="">
       <p:transition spd="slow" advTm="23013"/>
     </mc:Fallback>
   </mc:AlternateContent>
@@ -22299,11 +22311,11 @@
   <p:clrMapOvr>
     <a:masterClrMapping/>
   </p:clrMapOvr>
-  <mc:AlternateContent xmlns:mc="http://schemas.openxmlformats.org/markup-compatibility/2006">
-    <mc:Choice xmlns:p14="http://schemas.microsoft.com/office/powerpoint/2010/main" Requires="p14">
+  <mc:AlternateContent xmlns:mc="http://schemas.openxmlformats.org/markup-compatibility/2006" xmlns:p14="http://schemas.microsoft.com/office/powerpoint/2010/main">
+    <mc:Choice Requires="p14">
       <p:transition spd="slow" p14:dur="2000" advTm="16163"/>
     </mc:Choice>
-    <mc:Fallback>
+    <mc:Fallback xmlns="">
       <p:transition spd="slow" advTm="16163"/>
     </mc:Fallback>
   </mc:AlternateContent>

</xml_diff>